<commit_message>
Agregando listado de actividades, archivos modificados y sistema en wordpress
</commit_message>
<xml_diff>
--- a/Documentos/F5 Facat(Final).pptx
+++ b/Documentos/F5 Facat(Final).pptx
@@ -13,18 +13,20 @@
     <p:sldId id="261" r:id="rId7"/>
     <p:sldId id="262" r:id="rId8"/>
     <p:sldId id="263" r:id="rId9"/>
-    <p:sldId id="264" r:id="rId10"/>
-    <p:sldId id="265" r:id="rId11"/>
-    <p:sldId id="266" r:id="rId12"/>
-    <p:sldId id="267" r:id="rId13"/>
-    <p:sldId id="268" r:id="rId14"/>
-    <p:sldId id="269" r:id="rId15"/>
-    <p:sldId id="270" r:id="rId16"/>
-    <p:sldId id="271" r:id="rId17"/>
-    <p:sldId id="273" r:id="rId18"/>
-    <p:sldId id="274" r:id="rId19"/>
-    <p:sldId id="275" r:id="rId20"/>
-    <p:sldId id="276" r:id="rId21"/>
+    <p:sldId id="265" r:id="rId10"/>
+    <p:sldId id="277" r:id="rId11"/>
+    <p:sldId id="264" r:id="rId12"/>
+    <p:sldId id="266" r:id="rId13"/>
+    <p:sldId id="267" r:id="rId14"/>
+    <p:sldId id="268" r:id="rId15"/>
+    <p:sldId id="269" r:id="rId16"/>
+    <p:sldId id="270" r:id="rId17"/>
+    <p:sldId id="278" r:id="rId18"/>
+    <p:sldId id="271" r:id="rId19"/>
+    <p:sldId id="273" r:id="rId20"/>
+    <p:sldId id="274" r:id="rId21"/>
+    <p:sldId id="275" r:id="rId22"/>
+    <p:sldId id="276" r:id="rId23"/>
   </p:sldIdLst>
   <p:sldSz cx="12192000" cy="6858000"/>
   <p:notesSz cx="6858000" cy="9144000"/>
@@ -314,7 +316,7 @@
           <a:p>
             <a:fld id="{4AAD347D-5ACD-4C99-B74B-A9C85AD731AF}" type="datetimeFigureOut">
               <a:rPr lang="en-US" dirty="0"/>
-              <a:t>8/5/2016</a:t>
+              <a:t>8/19/2016</a:t>
             </a:fld>
             <a:endParaRPr lang="en-US" dirty="0"/>
           </a:p>
@@ -584,7 +586,7 @@
           <a:p>
             <a:fld id="{4509A250-FF31-4206-8172-F9D3106AACB1}" type="datetimeFigureOut">
               <a:rPr lang="en-US" dirty="0"/>
-              <a:t>8/5/2016</a:t>
+              <a:t>8/19/2016</a:t>
             </a:fld>
             <a:endParaRPr lang="en-US" dirty="0"/>
           </a:p>
@@ -773,7 +775,7 @@
           <a:p>
             <a:fld id="{4509A250-FF31-4206-8172-F9D3106AACB1}" type="datetimeFigureOut">
               <a:rPr lang="en-US" dirty="0"/>
-              <a:t>8/5/2016</a:t>
+              <a:t>8/19/2016</a:t>
             </a:fld>
             <a:endParaRPr lang="en-US" dirty="0"/>
           </a:p>
@@ -1036,7 +1038,7 @@
           <a:p>
             <a:fld id="{4509A250-FF31-4206-8172-F9D3106AACB1}" type="datetimeFigureOut">
               <a:rPr lang="en-US" dirty="0"/>
-              <a:t>8/5/2016</a:t>
+              <a:t>8/19/2016</a:t>
             </a:fld>
             <a:endParaRPr lang="en-US" dirty="0"/>
           </a:p>
@@ -1363,7 +1365,7 @@
           <a:p>
             <a:fld id="{4509A250-FF31-4206-8172-F9D3106AACB1}" type="datetimeFigureOut">
               <a:rPr lang="en-US" dirty="0"/>
-              <a:t>8/5/2016</a:t>
+              <a:t>8/19/2016</a:t>
             </a:fld>
             <a:endParaRPr lang="en-US" dirty="0"/>
           </a:p>
@@ -1968,7 +1970,7 @@
           <a:p>
             <a:fld id="{4509A250-FF31-4206-8172-F9D3106AACB1}" type="datetimeFigureOut">
               <a:rPr lang="en-US" dirty="0"/>
-              <a:t>8/5/2016</a:t>
+              <a:t>8/19/2016</a:t>
             </a:fld>
             <a:endParaRPr lang="en-US" dirty="0"/>
           </a:p>
@@ -2810,7 +2812,7 @@
           <a:p>
             <a:fld id="{4509A250-FF31-4206-8172-F9D3106AACB1}" type="datetimeFigureOut">
               <a:rPr lang="en-US" dirty="0"/>
-              <a:t>8/5/2016</a:t>
+              <a:t>8/19/2016</a:t>
             </a:fld>
             <a:endParaRPr lang="en-US" dirty="0"/>
           </a:p>
@@ -2975,7 +2977,7 @@
           <a:p>
             <a:fld id="{4509A250-FF31-4206-8172-F9D3106AACB1}" type="datetimeFigureOut">
               <a:rPr lang="en-US" dirty="0"/>
-              <a:t>8/5/2016</a:t>
+              <a:t>8/19/2016</a:t>
             </a:fld>
             <a:endParaRPr lang="en-US" dirty="0"/>
           </a:p>
@@ -3150,7 +3152,7 @@
           <a:p>
             <a:fld id="{4509A250-FF31-4206-8172-F9D3106AACB1}" type="datetimeFigureOut">
               <a:rPr lang="en-US" dirty="0"/>
-              <a:t>8/5/2016</a:t>
+              <a:t>8/19/2016</a:t>
             </a:fld>
             <a:endParaRPr lang="en-US" dirty="0"/>
           </a:p>
@@ -3315,7 +3317,7 @@
           <a:p>
             <a:fld id="{4509A250-FF31-4206-8172-F9D3106AACB1}" type="datetimeFigureOut">
               <a:rPr lang="en-US" dirty="0"/>
-              <a:t>8/5/2016</a:t>
+              <a:t>8/19/2016</a:t>
             </a:fld>
             <a:endParaRPr lang="en-US" dirty="0"/>
           </a:p>
@@ -3554,7 +3556,7 @@
           <a:p>
             <a:fld id="{4509A250-FF31-4206-8172-F9D3106AACB1}" type="datetimeFigureOut">
               <a:rPr lang="en-US" dirty="0"/>
-              <a:t>8/5/2016</a:t>
+              <a:t>8/19/2016</a:t>
             </a:fld>
             <a:endParaRPr lang="en-US" dirty="0"/>
           </a:p>
@@ -3841,7 +3843,7 @@
           <a:p>
             <a:fld id="{4509A250-FF31-4206-8172-F9D3106AACB1}" type="datetimeFigureOut">
               <a:rPr lang="en-US" dirty="0"/>
-              <a:t>8/5/2016</a:t>
+              <a:t>8/19/2016</a:t>
             </a:fld>
             <a:endParaRPr lang="en-US" dirty="0"/>
           </a:p>
@@ -4274,7 +4276,7 @@
           <a:p>
             <a:fld id="{4509A250-FF31-4206-8172-F9D3106AACB1}" type="datetimeFigureOut">
               <a:rPr lang="en-US" dirty="0"/>
-              <a:t>8/5/2016</a:t>
+              <a:t>8/19/2016</a:t>
             </a:fld>
             <a:endParaRPr lang="en-US" dirty="0"/>
           </a:p>
@@ -4387,7 +4389,7 @@
           <a:p>
             <a:fld id="{4509A250-FF31-4206-8172-F9D3106AACB1}" type="datetimeFigureOut">
               <a:rPr lang="en-US" dirty="0"/>
-              <a:t>8/5/2016</a:t>
+              <a:t>8/19/2016</a:t>
             </a:fld>
             <a:endParaRPr lang="en-US" dirty="0"/>
           </a:p>
@@ -4477,7 +4479,7 @@
           <a:p>
             <a:fld id="{4509A250-FF31-4206-8172-F9D3106AACB1}" type="datetimeFigureOut">
               <a:rPr lang="en-US" dirty="0"/>
-              <a:t>8/5/2016</a:t>
+              <a:t>8/19/2016</a:t>
             </a:fld>
             <a:endParaRPr lang="en-US" dirty="0"/>
           </a:p>
@@ -4751,7 +4753,7 @@
           <a:p>
             <a:fld id="{4509A250-FF31-4206-8172-F9D3106AACB1}" type="datetimeFigureOut">
               <a:rPr lang="en-US" dirty="0"/>
-              <a:t>8/5/2016</a:t>
+              <a:t>8/19/2016</a:t>
             </a:fld>
             <a:endParaRPr lang="en-US" dirty="0"/>
           </a:p>
@@ -5021,7 +5023,7 @@
           <a:p>
             <a:fld id="{4509A250-FF31-4206-8172-F9D3106AACB1}" type="datetimeFigureOut">
               <a:rPr lang="en-US" dirty="0"/>
-              <a:t>8/5/2016</a:t>
+              <a:t>8/19/2016</a:t>
             </a:fld>
             <a:endParaRPr lang="en-US" dirty="0"/>
           </a:p>
@@ -5445,7 +5447,7 @@
           <a:p>
             <a:fld id="{4509A250-FF31-4206-8172-F9D3106AACB1}" type="datetimeFigureOut">
               <a:rPr lang="en-US" dirty="0"/>
-              <a:t>8/5/2016</a:t>
+              <a:t>8/19/2016</a:t>
             </a:fld>
             <a:endParaRPr lang="en-US" dirty="0"/>
           </a:p>
@@ -6795,9 +6797,37 @@
           <a:chExt cx="0" cy="0"/>
         </a:xfrm>
       </p:grpSpPr>
+      <p:sp>
+        <p:nvSpPr>
+          <p:cNvPr id="5" name="Título 1"/>
+          <p:cNvSpPr>
+            <a:spLocks noGrp="1"/>
+          </p:cNvSpPr>
+          <p:nvPr>
+            <p:ph type="title"/>
+          </p:nvPr>
+        </p:nvSpPr>
+        <p:spPr>
+          <a:xfrm>
+            <a:off x="1040255" y="60832"/>
+            <a:ext cx="7868614" cy="997259"/>
+          </a:xfrm>
+        </p:spPr>
+        <p:txBody>
+          <a:bodyPr/>
+          <a:lstStyle/>
+          <a:p>
+            <a:r>
+              <a:rPr lang="es-PY" b="1" dirty="0" smtClean="0"/>
+              <a:t>MODELO DE CASO DE USO</a:t>
+            </a:r>
+            <a:endParaRPr lang="es-PY" b="1" dirty="0"/>
+          </a:p>
+        </p:txBody>
+      </p:sp>
       <p:pic>
         <p:nvPicPr>
-          <p:cNvPr id="4" name="Marcador de contenido 3"/>
+          <p:cNvPr id="3" name="Marcador de contenido 2"/>
           <p:cNvPicPr>
             <a:picLocks noGrp="1" noChangeAspect="1"/>
           </p:cNvPicPr>
@@ -6819,76 +6849,15 @@
         </p:blipFill>
         <p:spPr>
           <a:xfrm>
-            <a:off x="646533" y="1058091"/>
-            <a:ext cx="5440758" cy="5445793"/>
+            <a:off x="2526151" y="1058091"/>
+            <a:ext cx="6265152" cy="5276254"/>
           </a:xfrm>
-          <a:prstGeom prst="rect">
-            <a:avLst/>
-          </a:prstGeom>
-        </p:spPr>
-      </p:pic>
-      <p:sp>
-        <p:nvSpPr>
-          <p:cNvPr id="5" name="Título 1"/>
-          <p:cNvSpPr>
-            <a:spLocks noGrp="1"/>
-          </p:cNvSpPr>
-          <p:nvPr>
-            <p:ph type="title"/>
-          </p:nvPr>
-        </p:nvSpPr>
-        <p:spPr>
-          <a:xfrm>
-            <a:off x="1040255" y="60832"/>
-            <a:ext cx="7868614" cy="997259"/>
-          </a:xfrm>
-        </p:spPr>
-        <p:txBody>
-          <a:bodyPr/>
-          <a:lstStyle/>
-          <a:p>
-            <a:r>
-              <a:rPr lang="es-PY" b="1" dirty="0" smtClean="0"/>
-              <a:t>MODELO DE CASO DE USO</a:t>
-            </a:r>
-            <a:endParaRPr lang="es-PY" b="1" dirty="0"/>
-          </a:p>
-        </p:txBody>
-      </p:sp>
-      <p:pic>
-        <p:nvPicPr>
-          <p:cNvPr id="6" name="Marcador de contenido 3"/>
-          <p:cNvPicPr>
-            <a:picLocks noChangeAspect="1"/>
-          </p:cNvPicPr>
-          <p:nvPr/>
-        </p:nvPicPr>
-        <p:blipFill>
-          <a:blip r:embed="rId3">
-            <a:extLst>
-              <a:ext uri="{28A0092B-C50C-407E-A947-70E740481C1C}">
-                <a14:useLocalDpi xmlns:a14="http://schemas.microsoft.com/office/drawing/2010/main" val="0"/>
-              </a:ext>
-            </a:extLst>
-          </a:blip>
-          <a:stretch>
-            <a:fillRect/>
-          </a:stretch>
-        </p:blipFill>
-        <p:spPr>
-          <a:xfrm>
-            <a:off x="6450403" y="2502813"/>
-            <a:ext cx="4313819" cy="2643953"/>
-          </a:xfrm>
-          <a:prstGeom prst="rect">
-            <a:avLst/>
-          </a:prstGeom>
         </p:spPr>
       </p:pic>
     </p:spTree>
     <p:extLst>
       <p:ext uri="{BB962C8B-B14F-4D97-AF65-F5344CB8AC3E}">
-        <p14:creationId xmlns:p14="http://schemas.microsoft.com/office/powerpoint/2010/main" val="1586590032"/>
+        <p14:creationId xmlns:p14="http://schemas.microsoft.com/office/powerpoint/2010/main" val="54798191"/>
       </p:ext>
     </p:extLst>
   </p:cSld>
@@ -6922,36 +6891,15 @@
           <a:chExt cx="0" cy="0"/>
         </a:xfrm>
       </p:grpSpPr>
-      <p:sp>
-        <p:nvSpPr>
-          <p:cNvPr id="2" name="Título 1"/>
-          <p:cNvSpPr>
-            <a:spLocks noGrp="1"/>
-          </p:cNvSpPr>
-          <p:nvPr>
-            <p:ph type="title"/>
-          </p:nvPr>
-        </p:nvSpPr>
-        <p:spPr/>
-        <p:txBody>
-          <a:bodyPr/>
-          <a:lstStyle/>
-          <a:p>
-            <a:r>
-              <a:rPr lang="es-ES" b="1" dirty="0"/>
-              <a:t>DIAGRAMA DE ACTIVIDADES</a:t>
-            </a:r>
-            <a:endParaRPr lang="es-PY" dirty="0"/>
-          </a:p>
-        </p:txBody>
-      </p:sp>
       <p:pic>
         <p:nvPicPr>
-          <p:cNvPr id="4" name="Imagen 3"/>
+          <p:cNvPr id="4" name="Marcador de contenido 3"/>
           <p:cNvPicPr>
-            <a:picLocks noChangeAspect="1"/>
+            <a:picLocks noGrp="1" noChangeAspect="1"/>
           </p:cNvPicPr>
-          <p:nvPr/>
+          <p:nvPr>
+            <p:ph idx="1"/>
+          </p:nvPr>
         </p:nvPicPr>
         <p:blipFill>
           <a:blip r:embed="rId2">
@@ -6967,8 +6915,8 @@
         </p:blipFill>
         <p:spPr>
           <a:xfrm>
-            <a:off x="1254633" y="1516072"/>
-            <a:ext cx="9274030" cy="4523490"/>
+            <a:off x="2752357" y="152354"/>
+            <a:ext cx="6587586" cy="6561954"/>
           </a:xfrm>
           <a:prstGeom prst="rect">
             <a:avLst/>
@@ -6978,7 +6926,7 @@
     </p:spTree>
     <p:extLst>
       <p:ext uri="{BB962C8B-B14F-4D97-AF65-F5344CB8AC3E}">
-        <p14:creationId xmlns:p14="http://schemas.microsoft.com/office/powerpoint/2010/main" val="1799874301"/>
+        <p14:creationId xmlns:p14="http://schemas.microsoft.com/office/powerpoint/2010/main" val="3727538051"/>
       </p:ext>
     </p:extLst>
   </p:cSld>
@@ -7028,47 +6976,17 @@
           <a:lstStyle/>
           <a:p>
             <a:r>
-              <a:rPr lang="es-PY" b="1" dirty="0" smtClean="0"/>
-              <a:t>DIAGRAMA DE ESTADOS</a:t>
-            </a:r>
-            <a:endParaRPr lang="es-PY" b="1" dirty="0"/>
-          </a:p>
-        </p:txBody>
-      </p:sp>
-      <p:pic>
-        <p:nvPicPr>
-          <p:cNvPr id="4" name="Imagen 3"/>
-          <p:cNvPicPr>
-            <a:picLocks noChangeAspect="1"/>
-          </p:cNvPicPr>
-          <p:nvPr/>
-        </p:nvPicPr>
-        <p:blipFill>
-          <a:blip r:embed="rId2">
-            <a:extLst>
-              <a:ext uri="{28A0092B-C50C-407E-A947-70E740481C1C}">
-                <a14:useLocalDpi xmlns:a14="http://schemas.microsoft.com/office/drawing/2010/main" val="0"/>
-              </a:ext>
-            </a:extLst>
-          </a:blip>
-          <a:stretch>
-            <a:fillRect/>
-          </a:stretch>
-        </p:blipFill>
-        <p:spPr>
-          <a:xfrm>
-            <a:off x="1294905" y="1853248"/>
-            <a:ext cx="8581434" cy="2674732"/>
-          </a:xfrm>
-          <a:prstGeom prst="rect">
-            <a:avLst/>
-          </a:prstGeom>
-        </p:spPr>
-      </p:pic>
+              <a:rPr lang="es-ES" b="1" dirty="0"/>
+              <a:t>DIAGRAMA DE ACTIVIDADES</a:t>
+            </a:r>
+            <a:endParaRPr lang="es-PY" dirty="0"/>
+          </a:p>
+        </p:txBody>
+      </p:sp>
     </p:spTree>
     <p:extLst>
       <p:ext uri="{BB962C8B-B14F-4D97-AF65-F5344CB8AC3E}">
-        <p14:creationId xmlns:p14="http://schemas.microsoft.com/office/powerpoint/2010/main" val="3299755159"/>
+        <p14:creationId xmlns:p14="http://schemas.microsoft.com/office/powerpoint/2010/main" val="1799874301"/>
       </p:ext>
     </p:extLst>
   </p:cSld>
@@ -7119,7 +7037,7 @@
           <a:p>
             <a:r>
               <a:rPr lang="es-PY" b="1" dirty="0" smtClean="0"/>
-              <a:t>DIAGRAMA DE INTERACCION</a:t>
+              <a:t>DIAGRAMA DE ESTADOS</a:t>
             </a:r>
             <a:endParaRPr lang="es-PY" b="1" dirty="0"/>
           </a:p>
@@ -7127,7 +7045,7 @@
       </p:sp>
       <p:pic>
         <p:nvPicPr>
-          <p:cNvPr id="4" name="Imagen 3"/>
+          <p:cNvPr id="3" name="Imagen 2"/>
           <p:cNvPicPr>
             <a:picLocks noChangeAspect="1"/>
           </p:cNvPicPr>
@@ -7147,8 +7065,8 @@
         </p:blipFill>
         <p:spPr>
           <a:xfrm>
-            <a:off x="1787180" y="1521711"/>
-            <a:ext cx="8263654" cy="4607389"/>
+            <a:off x="2288750" y="1707618"/>
+            <a:ext cx="7038130" cy="4047621"/>
           </a:xfrm>
           <a:prstGeom prst="rect">
             <a:avLst/>
@@ -7158,7 +7076,7 @@
     </p:spTree>
     <p:extLst>
       <p:ext uri="{BB962C8B-B14F-4D97-AF65-F5344CB8AC3E}">
-        <p14:creationId xmlns:p14="http://schemas.microsoft.com/office/powerpoint/2010/main" val="305250779"/>
+        <p14:creationId xmlns:p14="http://schemas.microsoft.com/office/powerpoint/2010/main" val="3299755159"/>
       </p:ext>
     </p:extLst>
   </p:cSld>
@@ -7209,7 +7127,7 @@
           <a:p>
             <a:r>
               <a:rPr lang="es-PY" b="1" dirty="0" smtClean="0"/>
-              <a:t>DIAGRAMA DE SECUENCIA</a:t>
+              <a:t>DIAGRAMA DE INTERACCION</a:t>
             </a:r>
             <a:endParaRPr lang="es-PY" b="1" dirty="0"/>
           </a:p>
@@ -7217,7 +7135,7 @@
       </p:sp>
       <p:pic>
         <p:nvPicPr>
-          <p:cNvPr id="3" name="Imagen 2"/>
+          <p:cNvPr id="5" name="Imagen 4"/>
           <p:cNvPicPr>
             <a:picLocks noChangeAspect="1"/>
           </p:cNvPicPr>
@@ -7237,8 +7155,8 @@
         </p:blipFill>
         <p:spPr>
           <a:xfrm>
-            <a:off x="1463931" y="1447444"/>
-            <a:ext cx="7769082" cy="4806666"/>
+            <a:off x="1103481" y="1420943"/>
+            <a:ext cx="8053581" cy="4719159"/>
           </a:xfrm>
           <a:prstGeom prst="rect">
             <a:avLst/>
@@ -7248,7 +7166,7 @@
     </p:spTree>
     <p:extLst>
       <p:ext uri="{BB962C8B-B14F-4D97-AF65-F5344CB8AC3E}">
-        <p14:creationId xmlns:p14="http://schemas.microsoft.com/office/powerpoint/2010/main" val="2621678191"/>
+        <p14:creationId xmlns:p14="http://schemas.microsoft.com/office/powerpoint/2010/main" val="305250779"/>
       </p:ext>
     </p:extLst>
   </p:cSld>
@@ -7299,42 +7217,77 @@
           <a:p>
             <a:r>
               <a:rPr lang="es-PY" b="1" dirty="0" smtClean="0"/>
-              <a:t>DIAGRAMA DE PAQUETES</a:t>
+              <a:t>DIAGRAMA DE SECUENCIA</a:t>
             </a:r>
             <a:endParaRPr lang="es-PY" b="1" dirty="0"/>
           </a:p>
         </p:txBody>
       </p:sp>
-      <p:pic>
-        <p:nvPicPr>
-          <p:cNvPr id="4" name="Imagen 3"/>
-          <p:cNvPicPr>
-            <a:picLocks noChangeAspect="1"/>
-          </p:cNvPicPr>
-          <p:nvPr/>
-        </p:nvPicPr>
-        <p:blipFill>
-          <a:blip r:embed="rId2">
-            <a:extLst>
-              <a:ext uri="{28A0092B-C50C-407E-A947-70E740481C1C}">
-                <a14:useLocalDpi xmlns:a14="http://schemas.microsoft.com/office/drawing/2010/main" val="0"/>
-              </a:ext>
-            </a:extLst>
-          </a:blip>
-          <a:stretch>
-            <a:fillRect/>
-          </a:stretch>
-        </p:blipFill>
+    </p:spTree>
+    <p:extLst>
+      <p:ext uri="{BB962C8B-B14F-4D97-AF65-F5344CB8AC3E}">
+        <p14:creationId xmlns:p14="http://schemas.microsoft.com/office/powerpoint/2010/main" val="2621678191"/>
+      </p:ext>
+    </p:extLst>
+  </p:cSld>
+  <p:clrMapOvr>
+    <a:masterClrMapping/>
+  </p:clrMapOvr>
+  <p:timing>
+    <p:tnLst>
+      <p:par>
+        <p:cTn id="1" dur="indefinite" restart="never" nodeType="tmRoot"/>
+      </p:par>
+    </p:tnLst>
+  </p:timing>
+</p:sld>
+</file>
+
+<file path=ppt/slides/slide16.xml><?xml version="1.0" encoding="utf-8"?>
+<p:sld xmlns:a="http://schemas.openxmlformats.org/drawingml/2006/main" xmlns:r="http://schemas.openxmlformats.org/officeDocument/2006/relationships" xmlns:p="http://schemas.openxmlformats.org/presentationml/2006/main">
+  <p:cSld>
+    <p:spTree>
+      <p:nvGrpSpPr>
+        <p:cNvPr id="1" name=""/>
+        <p:cNvGrpSpPr/>
+        <p:nvPr/>
+      </p:nvGrpSpPr>
+      <p:grpSpPr>
+        <a:xfrm>
+          <a:off x="0" y="0"/>
+          <a:ext cx="0" cy="0"/>
+          <a:chOff x="0" y="0"/>
+          <a:chExt cx="0" cy="0"/>
+        </a:xfrm>
+      </p:grpSpPr>
+      <p:sp>
+        <p:nvSpPr>
+          <p:cNvPr id="2" name="Título 1"/>
+          <p:cNvSpPr>
+            <a:spLocks noGrp="1"/>
+          </p:cNvSpPr>
+          <p:nvPr>
+            <p:ph type="title"/>
+          </p:nvPr>
+        </p:nvSpPr>
         <p:spPr>
           <a:xfrm>
-            <a:off x="1526056" y="2286000"/>
-            <a:ext cx="7644831" cy="3766659"/>
+            <a:off x="646109" y="0"/>
+            <a:ext cx="9404723" cy="1400530"/>
           </a:xfrm>
-          <a:prstGeom prst="rect">
-            <a:avLst/>
-          </a:prstGeom>
         </p:spPr>
-      </p:pic>
+        <p:txBody>
+          <a:bodyPr/>
+          <a:lstStyle/>
+          <a:p>
+            <a:r>
+              <a:rPr lang="es-PY" b="1" dirty="0" smtClean="0"/>
+              <a:t>DIAGRAMA DE PAQUETES</a:t>
+            </a:r>
+            <a:endParaRPr lang="es-PY" b="1" dirty="0"/>
+          </a:p>
+        </p:txBody>
+      </p:sp>
     </p:spTree>
     <p:extLst>
       <p:ext uri="{BB962C8B-B14F-4D97-AF65-F5344CB8AC3E}">
@@ -7355,7 +7308,106 @@
 </p:sld>
 </file>
 
-<file path=ppt/slides/slide16.xml><?xml version="1.0" encoding="utf-8"?>
+<file path=ppt/slides/slide17.xml><?xml version="1.0" encoding="utf-8"?>
+<p:sld xmlns:a="http://schemas.openxmlformats.org/drawingml/2006/main" xmlns:r="http://schemas.openxmlformats.org/officeDocument/2006/relationships" xmlns:p="http://schemas.openxmlformats.org/presentationml/2006/main">
+  <p:cSld>
+    <p:spTree>
+      <p:nvGrpSpPr>
+        <p:cNvPr id="1" name=""/>
+        <p:cNvGrpSpPr/>
+        <p:nvPr/>
+      </p:nvGrpSpPr>
+      <p:grpSpPr>
+        <a:xfrm>
+          <a:off x="0" y="0"/>
+          <a:ext cx="0" cy="0"/>
+          <a:chOff x="0" y="0"/>
+          <a:chExt cx="0" cy="0"/>
+        </a:xfrm>
+      </p:grpSpPr>
+      <p:sp>
+        <p:nvSpPr>
+          <p:cNvPr id="2" name="Título 1"/>
+          <p:cNvSpPr>
+            <a:spLocks noGrp="1"/>
+          </p:cNvSpPr>
+          <p:nvPr>
+            <p:ph type="title"/>
+          </p:nvPr>
+        </p:nvSpPr>
+        <p:spPr>
+          <a:xfrm>
+            <a:off x="646109" y="0"/>
+            <a:ext cx="9404723" cy="1400530"/>
+          </a:xfrm>
+        </p:spPr>
+        <p:txBody>
+          <a:bodyPr/>
+          <a:lstStyle/>
+          <a:p>
+            <a:r>
+              <a:rPr lang="es-PY" b="1" dirty="0" smtClean="0"/>
+              <a:t>DIAGRAMA DE </a:t>
+            </a:r>
+            <a:r>
+              <a:rPr lang="es-PY" b="1" dirty="0" smtClean="0"/>
+              <a:t>OBJETOS</a:t>
+            </a:r>
+            <a:endParaRPr lang="es-PY" b="1" dirty="0"/>
+          </a:p>
+        </p:txBody>
+      </p:sp>
+      <p:pic>
+        <p:nvPicPr>
+          <p:cNvPr id="3" name="Imagen 2"/>
+          <p:cNvPicPr>
+            <a:picLocks noChangeAspect="1"/>
+          </p:cNvPicPr>
+          <p:nvPr/>
+        </p:nvPicPr>
+        <p:blipFill>
+          <a:blip r:embed="rId2">
+            <a:extLst>
+              <a:ext uri="{28A0092B-C50C-407E-A947-70E740481C1C}">
+                <a14:useLocalDpi xmlns:a14="http://schemas.microsoft.com/office/drawing/2010/main" val="0"/>
+              </a:ext>
+            </a:extLst>
+          </a:blip>
+          <a:stretch>
+            <a:fillRect/>
+          </a:stretch>
+        </p:blipFill>
+        <p:spPr>
+          <a:xfrm>
+            <a:off x="646108" y="813349"/>
+            <a:ext cx="10326691" cy="5822581"/>
+          </a:xfrm>
+          <a:prstGeom prst="rect">
+            <a:avLst/>
+          </a:prstGeom>
+        </p:spPr>
+      </p:pic>
+    </p:spTree>
+    <p:extLst>
+      <p:ext uri="{BB962C8B-B14F-4D97-AF65-F5344CB8AC3E}">
+        <p14:creationId xmlns:p14="http://schemas.microsoft.com/office/powerpoint/2010/main" val="2860980866"/>
+      </p:ext>
+    </p:extLst>
+  </p:cSld>
+  <p:clrMapOvr>
+    <a:masterClrMapping/>
+  </p:clrMapOvr>
+  <p:timing>
+    <p:tnLst>
+      <p:par>
+        <p:cTn id="1" dur="indefinite" restart="never" nodeType="tmRoot"/>
+      </p:par>
+    </p:tnLst>
+  </p:timing>
+</p:sld>
+</file>
+
+<file path=ppt/slides/slide18.xml><?xml version="1.0" encoding="utf-8"?>
 <p:sld xmlns:a="http://schemas.openxmlformats.org/drawingml/2006/main" xmlns:r="http://schemas.openxmlformats.org/officeDocument/2006/relationships" xmlns:p="http://schemas.openxmlformats.org/presentationml/2006/main">
   <p:cSld>
     <p:spTree>
@@ -7445,225 +7497,6 @@
 </p:sld>
 </file>
 
-<file path=ppt/slides/slide17.xml><?xml version="1.0" encoding="utf-8"?>
-<p:sld xmlns:a="http://schemas.openxmlformats.org/drawingml/2006/main" xmlns:r="http://schemas.openxmlformats.org/officeDocument/2006/relationships" xmlns:p="http://schemas.openxmlformats.org/presentationml/2006/main">
-  <p:cSld>
-    <p:spTree>
-      <p:nvGrpSpPr>
-        <p:cNvPr id="1" name=""/>
-        <p:cNvGrpSpPr/>
-        <p:nvPr/>
-      </p:nvGrpSpPr>
-      <p:grpSpPr>
-        <a:xfrm>
-          <a:off x="0" y="0"/>
-          <a:ext cx="0" cy="0"/>
-          <a:chOff x="0" y="0"/>
-          <a:chExt cx="0" cy="0"/>
-        </a:xfrm>
-      </p:grpSpPr>
-      <p:sp>
-        <p:nvSpPr>
-          <p:cNvPr id="4" name="Título 1"/>
-          <p:cNvSpPr txBox="1">
-            <a:spLocks/>
-          </p:cNvSpPr>
-          <p:nvPr/>
-        </p:nvSpPr>
-        <p:spPr>
-          <a:xfrm>
-            <a:off x="1789612" y="2638698"/>
-            <a:ext cx="9013371" cy="1436914"/>
-          </a:xfrm>
-          <a:prstGeom prst="rect">
-            <a:avLst/>
-          </a:prstGeom>
-        </p:spPr>
-        <p:txBody>
-          <a:bodyPr vert="horz" lIns="91440" tIns="45720" rIns="91440" bIns="45720" rtlCol="0" anchor="t">
-            <a:noAutofit/>
-          </a:bodyPr>
-          <a:lstStyle>
-            <a:lvl1pPr algn="l" defTabSz="457200" rtl="0" eaLnBrk="1" latinLnBrk="0" hangingPunct="1">
-              <a:spcBef>
-                <a:spcPct val="0"/>
-              </a:spcBef>
-              <a:buNone/>
-              <a:defRPr sz="4200" b="0" i="0" kern="1200">
-                <a:solidFill>
-                  <a:schemeClr val="tx2"/>
-                </a:solidFill>
-                <a:latin typeface="+mj-lt"/>
-                <a:ea typeface="+mj-ea"/>
-                <a:cs typeface="+mj-cs"/>
-              </a:defRPr>
-            </a:lvl1pPr>
-            <a:lvl2pPr eaLnBrk="1" hangingPunct="1">
-              <a:defRPr>
-                <a:solidFill>
-                  <a:schemeClr val="tx2"/>
-                </a:solidFill>
-              </a:defRPr>
-            </a:lvl2pPr>
-            <a:lvl3pPr eaLnBrk="1" hangingPunct="1">
-              <a:defRPr>
-                <a:solidFill>
-                  <a:schemeClr val="tx2"/>
-                </a:solidFill>
-              </a:defRPr>
-            </a:lvl3pPr>
-            <a:lvl4pPr eaLnBrk="1" hangingPunct="1">
-              <a:defRPr>
-                <a:solidFill>
-                  <a:schemeClr val="tx2"/>
-                </a:solidFill>
-              </a:defRPr>
-            </a:lvl4pPr>
-            <a:lvl5pPr eaLnBrk="1" hangingPunct="1">
-              <a:defRPr>
-                <a:solidFill>
-                  <a:schemeClr val="tx2"/>
-                </a:solidFill>
-              </a:defRPr>
-            </a:lvl5pPr>
-            <a:lvl6pPr eaLnBrk="1" hangingPunct="1">
-              <a:defRPr>
-                <a:solidFill>
-                  <a:schemeClr val="tx2"/>
-                </a:solidFill>
-              </a:defRPr>
-            </a:lvl6pPr>
-            <a:lvl7pPr eaLnBrk="1" hangingPunct="1">
-              <a:defRPr>
-                <a:solidFill>
-                  <a:schemeClr val="tx2"/>
-                </a:solidFill>
-              </a:defRPr>
-            </a:lvl7pPr>
-            <a:lvl8pPr eaLnBrk="1" hangingPunct="1">
-              <a:defRPr>
-                <a:solidFill>
-                  <a:schemeClr val="tx2"/>
-                </a:solidFill>
-              </a:defRPr>
-            </a:lvl8pPr>
-            <a:lvl9pPr eaLnBrk="1" hangingPunct="1">
-              <a:defRPr>
-                <a:solidFill>
-                  <a:schemeClr val="tx2"/>
-                </a:solidFill>
-              </a:defRPr>
-            </a:lvl9pPr>
-          </a:lstStyle>
-          <a:p>
-            <a:r>
-              <a:rPr lang="es-ES" sz="7200" b="1" dirty="0"/>
-              <a:t>ANÁLISIS DE RIESGO</a:t>
-            </a:r>
-            <a:endParaRPr lang="es-PY" sz="7200" b="1" dirty="0"/>
-          </a:p>
-          <a:p>
-            <a:endParaRPr lang="es-PY" sz="7200" b="1" dirty="0"/>
-          </a:p>
-        </p:txBody>
-      </p:sp>
-    </p:spTree>
-    <p:extLst>
-      <p:ext uri="{BB962C8B-B14F-4D97-AF65-F5344CB8AC3E}">
-        <p14:creationId xmlns:p14="http://schemas.microsoft.com/office/powerpoint/2010/main" val="126549745"/>
-      </p:ext>
-    </p:extLst>
-  </p:cSld>
-  <p:clrMapOvr>
-    <a:masterClrMapping/>
-  </p:clrMapOvr>
-  <p:timing>
-    <p:tnLst>
-      <p:par>
-        <p:cTn id="1" dur="indefinite" restart="never" nodeType="tmRoot"/>
-      </p:par>
-    </p:tnLst>
-  </p:timing>
-</p:sld>
-</file>
-
-<file path=ppt/slides/slide18.xml><?xml version="1.0" encoding="utf-8"?>
-<p:sld xmlns:a="http://schemas.openxmlformats.org/drawingml/2006/main" xmlns:r="http://schemas.openxmlformats.org/officeDocument/2006/relationships" xmlns:p="http://schemas.openxmlformats.org/presentationml/2006/main">
-  <p:cSld>
-    <p:spTree>
-      <p:nvGrpSpPr>
-        <p:cNvPr id="1" name=""/>
-        <p:cNvGrpSpPr/>
-        <p:nvPr/>
-      </p:nvGrpSpPr>
-      <p:grpSpPr>
-        <a:xfrm>
-          <a:off x="0" y="0"/>
-          <a:ext cx="0" cy="0"/>
-          <a:chOff x="0" y="0"/>
-          <a:chExt cx="0" cy="0"/>
-        </a:xfrm>
-      </p:grpSpPr>
-      <p:sp>
-        <p:nvSpPr>
-          <p:cNvPr id="3" name="Marcador de contenido 2"/>
-          <p:cNvSpPr>
-            <a:spLocks noGrp="1"/>
-          </p:cNvSpPr>
-          <p:nvPr>
-            <p:ph idx="1"/>
-          </p:nvPr>
-        </p:nvSpPr>
-        <p:spPr>
-          <a:xfrm>
-            <a:off x="1142501" y="1256084"/>
-            <a:ext cx="8946541" cy="4195481"/>
-          </a:xfrm>
-        </p:spPr>
-        <p:txBody>
-          <a:bodyPr/>
-          <a:lstStyle/>
-          <a:p>
-            <a:r>
-              <a:rPr lang="es-PY" dirty="0"/>
-              <a:t>Un riesgo es una variable del proyecto que pone en peligro o impide el éxito del mismo. Es la “probabilidad  de que un proyecto experimente sucesos no deseables, como retrasos en las fechas, excesos de costes, o la cancelación directa</a:t>
-            </a:r>
-            <a:r>
-              <a:rPr lang="es-PY" dirty="0" smtClean="0"/>
-              <a:t>”</a:t>
-            </a:r>
-          </a:p>
-          <a:p>
-            <a:r>
-              <a:rPr lang="es-PY" dirty="0"/>
-              <a:t>El objetivo del presente plan es asegurar que el proyecto se concrete dentro de los plazos previstos y observando todos los requerimientos fijados por los futuros usuarios. Permitiendo, al mismo tiempo, la detección oportuna de los problemas técnicos que se puedan presentar y la ejecución de un adecuado control y gestión de los cambios que se vayan presentando durante el desarrollo.</a:t>
-            </a:r>
-          </a:p>
-          <a:p>
-            <a:endParaRPr lang="es-PY" dirty="0"/>
-          </a:p>
-        </p:txBody>
-      </p:sp>
-    </p:spTree>
-    <p:extLst>
-      <p:ext uri="{BB962C8B-B14F-4D97-AF65-F5344CB8AC3E}">
-        <p14:creationId xmlns:p14="http://schemas.microsoft.com/office/powerpoint/2010/main" val="3638085557"/>
-      </p:ext>
-    </p:extLst>
-  </p:cSld>
-  <p:clrMapOvr>
-    <a:masterClrMapping/>
-  </p:clrMapOvr>
-  <p:timing>
-    <p:tnLst>
-      <p:par>
-        <p:cTn id="1" dur="indefinite" restart="never" nodeType="tmRoot"/>
-      </p:par>
-    </p:tnLst>
-  </p:timing>
-</p:sld>
-</file>
-
 <file path=ppt/slides/slide19.xml><?xml version="1.0" encoding="utf-8"?>
 <p:sld xmlns:a="http://schemas.openxmlformats.org/drawingml/2006/main" xmlns:r="http://schemas.openxmlformats.org/officeDocument/2006/relationships" xmlns:p="http://schemas.openxmlformats.org/presentationml/2006/main">
   <p:cSld>
@@ -7691,8 +7524,8 @@
         </p:nvSpPr>
         <p:spPr>
           <a:xfrm>
-            <a:off x="209007" y="1685107"/>
-            <a:ext cx="10920548" cy="3422469"/>
+            <a:off x="1789612" y="2638698"/>
+            <a:ext cx="9013371" cy="1436914"/>
           </a:xfrm>
           <a:prstGeom prst="rect">
             <a:avLst/>
@@ -7775,48 +7608,21 @@
             </a:lvl9pPr>
           </a:lstStyle>
           <a:p>
-            <a:pPr algn="ctr"/>
-            <a:r>
-              <a:rPr lang="es-PY" sz="6000" b="1" dirty="0"/>
-              <a:t>PLAN</a:t>
-            </a:r>
-            <a:r>
-              <a:rPr lang="es-ES" sz="6000" b="1" dirty="0"/>
-              <a:t/>
-            </a:r>
-            <a:br>
-              <a:rPr lang="es-ES" sz="6000" b="1" dirty="0"/>
-            </a:br>
-            <a:r>
-              <a:rPr lang="es-PY" sz="6000" b="1" dirty="0"/>
-              <a:t>DE</a:t>
-            </a:r>
-            <a:r>
-              <a:rPr lang="es-ES" sz="6000" b="1" dirty="0"/>
-              <a:t/>
-            </a:r>
-            <a:br>
-              <a:rPr lang="es-ES" sz="6000" b="1" dirty="0"/>
-            </a:br>
-            <a:r>
-              <a:rPr lang="es-PY" sz="6000" b="1" dirty="0"/>
-              <a:t>CONFIGURACION</a:t>
-            </a:r>
-            <a:r>
-              <a:rPr lang="es-ES" sz="11500" b="1" dirty="0"/>
-              <a:t/>
-            </a:r>
-            <a:br>
-              <a:rPr lang="es-ES" sz="11500" b="1" dirty="0"/>
-            </a:br>
-            <a:endParaRPr lang="es-PY" sz="11500" b="1" dirty="0"/>
+            <a:r>
+              <a:rPr lang="es-ES" sz="7200" b="1" dirty="0"/>
+              <a:t>ANÁLISIS DE RIESGO</a:t>
+            </a:r>
+            <a:endParaRPr lang="es-PY" sz="7200" b="1" dirty="0"/>
+          </a:p>
+          <a:p>
+            <a:endParaRPr lang="es-PY" sz="7200" b="1" dirty="0"/>
           </a:p>
         </p:txBody>
       </p:sp>
     </p:spTree>
     <p:extLst>
       <p:ext uri="{BB962C8B-B14F-4D97-AF65-F5344CB8AC3E}">
-        <p14:creationId xmlns:p14="http://schemas.microsoft.com/office/powerpoint/2010/main" val="3527988828"/>
+        <p14:creationId xmlns:p14="http://schemas.microsoft.com/office/powerpoint/2010/main" val="126549745"/>
       </p:ext>
     </p:extLst>
   </p:cSld>
@@ -8009,6 +7815,252 @@
           <a:bodyPr/>
           <a:lstStyle/>
           <a:p>
+            <a:r>
+              <a:rPr lang="es-PY" dirty="0"/>
+              <a:t>Un riesgo es una variable del proyecto que pone en peligro o impide el éxito del mismo. Es la “probabilidad  de que un proyecto experimente sucesos no deseables, como retrasos en las fechas, excesos de costes, o la cancelación directa</a:t>
+            </a:r>
+            <a:r>
+              <a:rPr lang="es-PY" dirty="0" smtClean="0"/>
+              <a:t>”</a:t>
+            </a:r>
+          </a:p>
+          <a:p>
+            <a:r>
+              <a:rPr lang="es-PY" dirty="0"/>
+              <a:t>El objetivo del presente plan es asegurar que el proyecto se concrete dentro de los plazos previstos y observando todos los requerimientos fijados por los futuros usuarios. Permitiendo, al mismo tiempo, la detección oportuna de los problemas técnicos que se puedan presentar y la ejecución de un adecuado control y gestión de los cambios que se vayan presentando durante el desarrollo.</a:t>
+            </a:r>
+          </a:p>
+          <a:p>
+            <a:endParaRPr lang="es-PY" dirty="0"/>
+          </a:p>
+        </p:txBody>
+      </p:sp>
+    </p:spTree>
+    <p:extLst>
+      <p:ext uri="{BB962C8B-B14F-4D97-AF65-F5344CB8AC3E}">
+        <p14:creationId xmlns:p14="http://schemas.microsoft.com/office/powerpoint/2010/main" val="3638085557"/>
+      </p:ext>
+    </p:extLst>
+  </p:cSld>
+  <p:clrMapOvr>
+    <a:masterClrMapping/>
+  </p:clrMapOvr>
+  <p:timing>
+    <p:tnLst>
+      <p:par>
+        <p:cTn id="1" dur="indefinite" restart="never" nodeType="tmRoot"/>
+      </p:par>
+    </p:tnLst>
+  </p:timing>
+</p:sld>
+</file>
+
+<file path=ppt/slides/slide21.xml><?xml version="1.0" encoding="utf-8"?>
+<p:sld xmlns:a="http://schemas.openxmlformats.org/drawingml/2006/main" xmlns:r="http://schemas.openxmlformats.org/officeDocument/2006/relationships" xmlns:p="http://schemas.openxmlformats.org/presentationml/2006/main">
+  <p:cSld>
+    <p:spTree>
+      <p:nvGrpSpPr>
+        <p:cNvPr id="1" name=""/>
+        <p:cNvGrpSpPr/>
+        <p:nvPr/>
+      </p:nvGrpSpPr>
+      <p:grpSpPr>
+        <a:xfrm>
+          <a:off x="0" y="0"/>
+          <a:ext cx="0" cy="0"/>
+          <a:chOff x="0" y="0"/>
+          <a:chExt cx="0" cy="0"/>
+        </a:xfrm>
+      </p:grpSpPr>
+      <p:sp>
+        <p:nvSpPr>
+          <p:cNvPr id="4" name="Título 1"/>
+          <p:cNvSpPr txBox="1">
+            <a:spLocks/>
+          </p:cNvSpPr>
+          <p:nvPr/>
+        </p:nvSpPr>
+        <p:spPr>
+          <a:xfrm>
+            <a:off x="209007" y="1685107"/>
+            <a:ext cx="10920548" cy="3422469"/>
+          </a:xfrm>
+          <a:prstGeom prst="rect">
+            <a:avLst/>
+          </a:prstGeom>
+        </p:spPr>
+        <p:txBody>
+          <a:bodyPr vert="horz" lIns="91440" tIns="45720" rIns="91440" bIns="45720" rtlCol="0" anchor="t">
+            <a:noAutofit/>
+          </a:bodyPr>
+          <a:lstStyle>
+            <a:lvl1pPr algn="l" defTabSz="457200" rtl="0" eaLnBrk="1" latinLnBrk="0" hangingPunct="1">
+              <a:spcBef>
+                <a:spcPct val="0"/>
+              </a:spcBef>
+              <a:buNone/>
+              <a:defRPr sz="4200" b="0" i="0" kern="1200">
+                <a:solidFill>
+                  <a:schemeClr val="tx2"/>
+                </a:solidFill>
+                <a:latin typeface="+mj-lt"/>
+                <a:ea typeface="+mj-ea"/>
+                <a:cs typeface="+mj-cs"/>
+              </a:defRPr>
+            </a:lvl1pPr>
+            <a:lvl2pPr eaLnBrk="1" hangingPunct="1">
+              <a:defRPr>
+                <a:solidFill>
+                  <a:schemeClr val="tx2"/>
+                </a:solidFill>
+              </a:defRPr>
+            </a:lvl2pPr>
+            <a:lvl3pPr eaLnBrk="1" hangingPunct="1">
+              <a:defRPr>
+                <a:solidFill>
+                  <a:schemeClr val="tx2"/>
+                </a:solidFill>
+              </a:defRPr>
+            </a:lvl3pPr>
+            <a:lvl4pPr eaLnBrk="1" hangingPunct="1">
+              <a:defRPr>
+                <a:solidFill>
+                  <a:schemeClr val="tx2"/>
+                </a:solidFill>
+              </a:defRPr>
+            </a:lvl4pPr>
+            <a:lvl5pPr eaLnBrk="1" hangingPunct="1">
+              <a:defRPr>
+                <a:solidFill>
+                  <a:schemeClr val="tx2"/>
+                </a:solidFill>
+              </a:defRPr>
+            </a:lvl5pPr>
+            <a:lvl6pPr eaLnBrk="1" hangingPunct="1">
+              <a:defRPr>
+                <a:solidFill>
+                  <a:schemeClr val="tx2"/>
+                </a:solidFill>
+              </a:defRPr>
+            </a:lvl6pPr>
+            <a:lvl7pPr eaLnBrk="1" hangingPunct="1">
+              <a:defRPr>
+                <a:solidFill>
+                  <a:schemeClr val="tx2"/>
+                </a:solidFill>
+              </a:defRPr>
+            </a:lvl7pPr>
+            <a:lvl8pPr eaLnBrk="1" hangingPunct="1">
+              <a:defRPr>
+                <a:solidFill>
+                  <a:schemeClr val="tx2"/>
+                </a:solidFill>
+              </a:defRPr>
+            </a:lvl8pPr>
+            <a:lvl9pPr eaLnBrk="1" hangingPunct="1">
+              <a:defRPr>
+                <a:solidFill>
+                  <a:schemeClr val="tx2"/>
+                </a:solidFill>
+              </a:defRPr>
+            </a:lvl9pPr>
+          </a:lstStyle>
+          <a:p>
+            <a:pPr algn="ctr"/>
+            <a:r>
+              <a:rPr lang="es-PY" sz="6000" b="1" dirty="0"/>
+              <a:t>PLAN</a:t>
+            </a:r>
+            <a:r>
+              <a:rPr lang="es-ES" sz="6000" b="1" dirty="0"/>
+              <a:t/>
+            </a:r>
+            <a:br>
+              <a:rPr lang="es-ES" sz="6000" b="1" dirty="0"/>
+            </a:br>
+            <a:r>
+              <a:rPr lang="es-PY" sz="6000" b="1" dirty="0"/>
+              <a:t>DE</a:t>
+            </a:r>
+            <a:r>
+              <a:rPr lang="es-ES" sz="6000" b="1" dirty="0"/>
+              <a:t/>
+            </a:r>
+            <a:br>
+              <a:rPr lang="es-ES" sz="6000" b="1" dirty="0"/>
+            </a:br>
+            <a:r>
+              <a:rPr lang="es-PY" sz="6000" b="1" dirty="0"/>
+              <a:t>CONFIGURACION</a:t>
+            </a:r>
+            <a:r>
+              <a:rPr lang="es-ES" sz="11500" b="1" dirty="0"/>
+              <a:t/>
+            </a:r>
+            <a:br>
+              <a:rPr lang="es-ES" sz="11500" b="1" dirty="0"/>
+            </a:br>
+            <a:endParaRPr lang="es-PY" sz="11500" b="1" dirty="0"/>
+          </a:p>
+        </p:txBody>
+      </p:sp>
+    </p:spTree>
+    <p:extLst>
+      <p:ext uri="{BB962C8B-B14F-4D97-AF65-F5344CB8AC3E}">
+        <p14:creationId xmlns:p14="http://schemas.microsoft.com/office/powerpoint/2010/main" val="3527988828"/>
+      </p:ext>
+    </p:extLst>
+  </p:cSld>
+  <p:clrMapOvr>
+    <a:masterClrMapping/>
+  </p:clrMapOvr>
+  <p:timing>
+    <p:tnLst>
+      <p:par>
+        <p:cTn id="1" dur="indefinite" restart="never" nodeType="tmRoot"/>
+      </p:par>
+    </p:tnLst>
+  </p:timing>
+</p:sld>
+</file>
+
+<file path=ppt/slides/slide22.xml><?xml version="1.0" encoding="utf-8"?>
+<p:sld xmlns:a="http://schemas.openxmlformats.org/drawingml/2006/main" xmlns:r="http://schemas.openxmlformats.org/officeDocument/2006/relationships" xmlns:p="http://schemas.openxmlformats.org/presentationml/2006/main">
+  <p:cSld>
+    <p:spTree>
+      <p:nvGrpSpPr>
+        <p:cNvPr id="1" name=""/>
+        <p:cNvGrpSpPr/>
+        <p:nvPr/>
+      </p:nvGrpSpPr>
+      <p:grpSpPr>
+        <a:xfrm>
+          <a:off x="0" y="0"/>
+          <a:ext cx="0" cy="0"/>
+          <a:chOff x="0" y="0"/>
+          <a:chExt cx="0" cy="0"/>
+        </a:xfrm>
+      </p:grpSpPr>
+      <p:sp>
+        <p:nvSpPr>
+          <p:cNvPr id="3" name="Marcador de contenido 2"/>
+          <p:cNvSpPr>
+            <a:spLocks noGrp="1"/>
+          </p:cNvSpPr>
+          <p:nvPr>
+            <p:ph idx="1"/>
+          </p:nvPr>
+        </p:nvSpPr>
+        <p:spPr>
+          <a:xfrm>
+            <a:off x="1142501" y="1256084"/>
+            <a:ext cx="8946541" cy="4195481"/>
+          </a:xfrm>
+        </p:spPr>
+        <p:txBody>
+          <a:bodyPr/>
+          <a:lstStyle/>
+          <a:p>
             <a:pPr marL="457200" lvl="1" indent="0">
               <a:buNone/>
             </a:pPr>
@@ -9134,15 +9186,41 @@
           <a:chExt cx="0" cy="0"/>
         </a:xfrm>
       </p:grpSpPr>
+      <p:sp>
+        <p:nvSpPr>
+          <p:cNvPr id="5" name="Título 1"/>
+          <p:cNvSpPr>
+            <a:spLocks noGrp="1"/>
+          </p:cNvSpPr>
+          <p:nvPr>
+            <p:ph type="title"/>
+          </p:nvPr>
+        </p:nvSpPr>
+        <p:spPr>
+          <a:xfrm>
+            <a:off x="1040255" y="60832"/>
+            <a:ext cx="7868614" cy="997259"/>
+          </a:xfrm>
+        </p:spPr>
+        <p:txBody>
+          <a:bodyPr/>
+          <a:lstStyle/>
+          <a:p>
+            <a:r>
+              <a:rPr lang="es-PY" b="1" dirty="0" smtClean="0"/>
+              <a:t>MODELO DE CASO DE USO</a:t>
+            </a:r>
+            <a:endParaRPr lang="es-PY" b="1" dirty="0"/>
+          </a:p>
+        </p:txBody>
+      </p:sp>
       <p:pic>
         <p:nvPicPr>
-          <p:cNvPr id="4" name="Marcador de contenido 3"/>
+          <p:cNvPr id="6" name="Marcador de contenido 3"/>
           <p:cNvPicPr>
-            <a:picLocks noGrp="1" noChangeAspect="1"/>
+            <a:picLocks noChangeAspect="1"/>
           </p:cNvPicPr>
-          <p:nvPr>
-            <p:ph idx="1"/>
-          </p:nvPr>
+          <p:nvPr/>
         </p:nvPicPr>
         <p:blipFill>
           <a:blip r:embed="rId2">
@@ -9158,18 +9236,47 @@
         </p:blipFill>
         <p:spPr>
           <a:xfrm>
-            <a:off x="2752357" y="152354"/>
-            <a:ext cx="6587586" cy="6561954"/>
+            <a:off x="6751959" y="2427063"/>
+            <a:ext cx="4313819" cy="2643953"/>
           </a:xfrm>
           <a:prstGeom prst="rect">
             <a:avLst/>
           </a:prstGeom>
         </p:spPr>
       </p:pic>
+      <p:pic>
+        <p:nvPicPr>
+          <p:cNvPr id="8" name="Marcador de contenido 7"/>
+          <p:cNvPicPr>
+            <a:picLocks noGrp="1" noChangeAspect="1"/>
+          </p:cNvPicPr>
+          <p:nvPr>
+            <p:ph idx="1"/>
+          </p:nvPr>
+        </p:nvPicPr>
+        <p:blipFill>
+          <a:blip r:embed="rId3">
+            <a:extLst>
+              <a:ext uri="{28A0092B-C50C-407E-A947-70E740481C1C}">
+                <a14:useLocalDpi xmlns:a14="http://schemas.microsoft.com/office/drawing/2010/main" val="0"/>
+              </a:ext>
+            </a:extLst>
+          </a:blip>
+          <a:stretch>
+            <a:fillRect/>
+          </a:stretch>
+        </p:blipFill>
+        <p:spPr>
+          <a:xfrm>
+            <a:off x="575868" y="824074"/>
+            <a:ext cx="5550612" cy="5615915"/>
+          </a:xfrm>
+        </p:spPr>
+      </p:pic>
     </p:spTree>
     <p:extLst>
       <p:ext uri="{BB962C8B-B14F-4D97-AF65-F5344CB8AC3E}">
-        <p14:creationId xmlns:p14="http://schemas.microsoft.com/office/powerpoint/2010/main" val="3727538051"/>
+        <p14:creationId xmlns:p14="http://schemas.microsoft.com/office/powerpoint/2010/main" val="1586590032"/>
       </p:ext>
     </p:extLst>
   </p:cSld>

</xml_diff>